<commit_message>
Add backend logic for website(mongodb crud).
</commit_message>
<xml_diff>
--- a/node-mongodb/笔记.pptx
+++ b/node-mongodb/笔记.pptx
@@ -5,7 +5,7 @@
     <p:sldMasterId id="2147483648" r:id="rId1"/>
   </p:sldMasterIdLst>
   <p:notesMasterIdLst>
-    <p:notesMasterId r:id="rId11"/>
+    <p:notesMasterId r:id="rId16"/>
   </p:notesMasterIdLst>
   <p:sldIdLst>
     <p:sldId id="256" r:id="rId2"/>
@@ -17,6 +17,11 @@
     <p:sldId id="262" r:id="rId8"/>
     <p:sldId id="263" r:id="rId9"/>
     <p:sldId id="264" r:id="rId10"/>
+    <p:sldId id="265" r:id="rId11"/>
+    <p:sldId id="266" r:id="rId12"/>
+    <p:sldId id="267" r:id="rId13"/>
+    <p:sldId id="268" r:id="rId14"/>
+    <p:sldId id="269" r:id="rId15"/>
   </p:sldIdLst>
   <p:sldSz cx="12192000" cy="6858000"/>
   <p:notesSz cx="6858000" cy="9144000"/>
@@ -4011,6 +4016,1001 @@
 </p:sld>
 </file>
 
+<file path=ppt/slides/slide10.xml><?xml version="1.0" encoding="utf-8"?>
+<p:sld xmlns:a="http://schemas.openxmlformats.org/drawingml/2006/main" xmlns:r="http://schemas.openxmlformats.org/officeDocument/2006/relationships" xmlns:p="http://schemas.openxmlformats.org/presentationml/2006/main">
+  <p:cSld>
+    <p:bg>
+      <p:bgPr>
+        <a:solidFill>
+          <a:schemeClr val="bg1"/>
+        </a:solidFill>
+        <a:effectLst/>
+      </p:bgPr>
+    </p:bg>
+    <p:spTree>
+      <p:nvGrpSpPr>
+        <p:cNvPr id="1" name=""/>
+        <p:cNvGrpSpPr/>
+        <p:nvPr/>
+      </p:nvGrpSpPr>
+      <p:grpSpPr>
+        <a:xfrm>
+          <a:off x="0" y="0"/>
+          <a:ext cx="0" cy="0"/>
+          <a:chOff x="0" y="0"/>
+          <a:chExt cx="0" cy="0"/>
+        </a:xfrm>
+      </p:grpSpPr>
+      <p:sp>
+        <p:nvSpPr>
+          <p:cNvPr id="10" name="Rectangle 9">
+            <a:extLst>
+              <a:ext uri="{FF2B5EF4-FFF2-40B4-BE49-F238E27FC236}">
+                <a16:creationId xmlns:a16="http://schemas.microsoft.com/office/drawing/2014/main" id="{32BC26D8-82FB-445E-AA49-62A77D7C1EE0}"/>
+              </a:ext>
+            </a:extLst>
+          </p:cNvPr>
+          <p:cNvSpPr>
+            <a:spLocks noGrp="1" noRot="1" noChangeAspect="1" noMove="1" noResize="1" noEditPoints="1" noAdjustHandles="1" noChangeArrowheads="1" noChangeShapeType="1" noTextEdit="1"/>
+          </p:cNvSpPr>
+          <p:nvPr>
+            <p:extLst>
+              <p:ext uri="{386F3935-93C4-4BCD-93E2-E3B085C9AB24}">
+                <p16:designElem xmlns:p16="http://schemas.microsoft.com/office/powerpoint/2015/main" val="1"/>
+              </p:ext>
+            </p:extLst>
+          </p:nvPr>
+        </p:nvSpPr>
+        <p:spPr>
+          <a:xfrm>
+            <a:off x="0" y="0"/>
+            <a:ext cx="12192000" cy="6858000"/>
+          </a:xfrm>
+          <a:prstGeom prst="rect">
+            <a:avLst/>
+          </a:prstGeom>
+          <a:solidFill>
+            <a:schemeClr val="tx1">
+              <a:lumMod val="65000"/>
+              <a:lumOff val="35000"/>
+            </a:schemeClr>
+          </a:solidFill>
+          <a:ln>
+            <a:noFill/>
+          </a:ln>
+        </p:spPr>
+        <p:style>
+          <a:lnRef idx="2">
+            <a:schemeClr val="accent1">
+              <a:shade val="50000"/>
+            </a:schemeClr>
+          </a:lnRef>
+          <a:fillRef idx="1">
+            <a:schemeClr val="accent1"/>
+          </a:fillRef>
+          <a:effectRef idx="0">
+            <a:schemeClr val="accent1"/>
+          </a:effectRef>
+          <a:fontRef idx="minor">
+            <a:schemeClr val="lt1"/>
+          </a:fontRef>
+        </p:style>
+        <p:txBody>
+          <a:bodyPr rtlCol="0" anchor="ctr"/>
+          <a:lstStyle/>
+          <a:p>
+            <a:pPr algn="ctr"/>
+            <a:endParaRPr lang="en-US"/>
+          </a:p>
+        </p:txBody>
+      </p:sp>
+      <p:sp>
+        <p:nvSpPr>
+          <p:cNvPr id="12" name="Rectangle 11">
+            <a:extLst>
+              <a:ext uri="{FF2B5EF4-FFF2-40B4-BE49-F238E27FC236}">
+                <a16:creationId xmlns:a16="http://schemas.microsoft.com/office/drawing/2014/main" id="{CB44330D-EA18-4254-AA95-EB49948539B8}"/>
+              </a:ext>
+            </a:extLst>
+          </p:cNvPr>
+          <p:cNvSpPr>
+            <a:spLocks noGrp="1" noRot="1" noChangeAspect="1" noMove="1" noResize="1" noEditPoints="1" noAdjustHandles="1" noChangeArrowheads="1" noChangeShapeType="1" noTextEdit="1"/>
+          </p:cNvSpPr>
+          <p:nvPr>
+            <p:extLst>
+              <p:ext uri="{386F3935-93C4-4BCD-93E2-E3B085C9AB24}">
+                <p16:designElem xmlns:p16="http://schemas.microsoft.com/office/powerpoint/2015/main" val="1"/>
+              </p:ext>
+            </p:extLst>
+          </p:nvPr>
+        </p:nvSpPr>
+        <p:spPr>
+          <a:xfrm>
+            <a:off x="477012" y="480060"/>
+            <a:ext cx="11237976" cy="5897880"/>
+          </a:xfrm>
+          <a:prstGeom prst="rect">
+            <a:avLst/>
+          </a:prstGeom>
+          <a:solidFill>
+            <a:srgbClr val="FFFFFF"/>
+          </a:solidFill>
+          <a:ln>
+            <a:noFill/>
+          </a:ln>
+        </p:spPr>
+        <p:style>
+          <a:lnRef idx="2">
+            <a:schemeClr val="accent1">
+              <a:shade val="50000"/>
+            </a:schemeClr>
+          </a:lnRef>
+          <a:fillRef idx="1">
+            <a:schemeClr val="accent1"/>
+          </a:fillRef>
+          <a:effectRef idx="0">
+            <a:schemeClr val="accent1"/>
+          </a:effectRef>
+          <a:fontRef idx="minor">
+            <a:schemeClr val="lt1"/>
+          </a:fontRef>
+        </p:style>
+        <p:txBody>
+          <a:bodyPr rtlCol="0" anchor="ctr"/>
+          <a:lstStyle/>
+          <a:p>
+            <a:pPr algn="ctr"/>
+            <a:endParaRPr lang="en-US"/>
+          </a:p>
+        </p:txBody>
+      </p:sp>
+      <p:pic>
+        <p:nvPicPr>
+          <p:cNvPr id="5" name="Content Placeholder 4" descr="A screenshot of a cell phone&#10;&#10;Description generated with very high confidence">
+            <a:extLst>
+              <a:ext uri="{FF2B5EF4-FFF2-40B4-BE49-F238E27FC236}">
+                <a16:creationId xmlns:a16="http://schemas.microsoft.com/office/drawing/2014/main" id="{BA14EF7F-8221-4A78-94D1-4B2C8076EA98}"/>
+              </a:ext>
+            </a:extLst>
+          </p:cNvPr>
+          <p:cNvPicPr>
+            <a:picLocks noGrp="1" noChangeAspect="1"/>
+          </p:cNvPicPr>
+          <p:nvPr>
+            <p:ph idx="1"/>
+          </p:nvPr>
+        </p:nvPicPr>
+        <p:blipFill>
+          <a:blip r:embed="rId2">
+            <a:extLst>
+              <a:ext uri="{28A0092B-C50C-407E-A947-70E740481C1C}">
+                <a14:useLocalDpi xmlns:a14="http://schemas.microsoft.com/office/drawing/2010/main" val="0"/>
+              </a:ext>
+            </a:extLst>
+          </a:blip>
+          <a:stretch>
+            <a:fillRect/>
+          </a:stretch>
+        </p:blipFill>
+        <p:spPr>
+          <a:xfrm>
+            <a:off x="1891421" y="643467"/>
+            <a:ext cx="8409157" cy="5571066"/>
+          </a:xfrm>
+          <a:prstGeom prst="rect">
+            <a:avLst/>
+          </a:prstGeom>
+        </p:spPr>
+      </p:pic>
+    </p:spTree>
+    <p:extLst>
+      <p:ext uri="{BB962C8B-B14F-4D97-AF65-F5344CB8AC3E}">
+        <p14:creationId xmlns:p14="http://schemas.microsoft.com/office/powerpoint/2010/main" val="4073995389"/>
+      </p:ext>
+    </p:extLst>
+  </p:cSld>
+  <p:clrMapOvr>
+    <a:masterClrMapping/>
+  </p:clrMapOvr>
+</p:sld>
+</file>
+
+<file path=ppt/slides/slide11.xml><?xml version="1.0" encoding="utf-8"?>
+<p:sld xmlns:a="http://schemas.openxmlformats.org/drawingml/2006/main" xmlns:r="http://schemas.openxmlformats.org/officeDocument/2006/relationships" xmlns:p="http://schemas.openxmlformats.org/presentationml/2006/main">
+  <p:cSld>
+    <p:bg>
+      <p:bgPr>
+        <a:solidFill>
+          <a:schemeClr val="bg1"/>
+        </a:solidFill>
+        <a:effectLst/>
+      </p:bgPr>
+    </p:bg>
+    <p:spTree>
+      <p:nvGrpSpPr>
+        <p:cNvPr id="1" name=""/>
+        <p:cNvGrpSpPr/>
+        <p:nvPr/>
+      </p:nvGrpSpPr>
+      <p:grpSpPr>
+        <a:xfrm>
+          <a:off x="0" y="0"/>
+          <a:ext cx="0" cy="0"/>
+          <a:chOff x="0" y="0"/>
+          <a:chExt cx="0" cy="0"/>
+        </a:xfrm>
+      </p:grpSpPr>
+      <p:sp>
+        <p:nvSpPr>
+          <p:cNvPr id="10" name="Rectangle 9">
+            <a:extLst>
+              <a:ext uri="{FF2B5EF4-FFF2-40B4-BE49-F238E27FC236}">
+                <a16:creationId xmlns:a16="http://schemas.microsoft.com/office/drawing/2014/main" id="{32BC26D8-82FB-445E-AA49-62A77D7C1EE0}"/>
+              </a:ext>
+            </a:extLst>
+          </p:cNvPr>
+          <p:cNvSpPr>
+            <a:spLocks noGrp="1" noRot="1" noChangeAspect="1" noMove="1" noResize="1" noEditPoints="1" noAdjustHandles="1" noChangeArrowheads="1" noChangeShapeType="1" noTextEdit="1"/>
+          </p:cNvSpPr>
+          <p:nvPr>
+            <p:extLst>
+              <p:ext uri="{386F3935-93C4-4BCD-93E2-E3B085C9AB24}">
+                <p16:designElem xmlns:p16="http://schemas.microsoft.com/office/powerpoint/2015/main" val="1"/>
+              </p:ext>
+            </p:extLst>
+          </p:nvPr>
+        </p:nvSpPr>
+        <p:spPr>
+          <a:xfrm>
+            <a:off x="0" y="0"/>
+            <a:ext cx="12192000" cy="6858000"/>
+          </a:xfrm>
+          <a:prstGeom prst="rect">
+            <a:avLst/>
+          </a:prstGeom>
+          <a:solidFill>
+            <a:schemeClr val="tx1">
+              <a:lumMod val="65000"/>
+              <a:lumOff val="35000"/>
+            </a:schemeClr>
+          </a:solidFill>
+          <a:ln>
+            <a:noFill/>
+          </a:ln>
+        </p:spPr>
+        <p:style>
+          <a:lnRef idx="2">
+            <a:schemeClr val="accent1">
+              <a:shade val="50000"/>
+            </a:schemeClr>
+          </a:lnRef>
+          <a:fillRef idx="1">
+            <a:schemeClr val="accent1"/>
+          </a:fillRef>
+          <a:effectRef idx="0">
+            <a:schemeClr val="accent1"/>
+          </a:effectRef>
+          <a:fontRef idx="minor">
+            <a:schemeClr val="lt1"/>
+          </a:fontRef>
+        </p:style>
+        <p:txBody>
+          <a:bodyPr rtlCol="0" anchor="ctr"/>
+          <a:lstStyle/>
+          <a:p>
+            <a:pPr algn="ctr"/>
+            <a:endParaRPr lang="en-US"/>
+          </a:p>
+        </p:txBody>
+      </p:sp>
+      <p:sp>
+        <p:nvSpPr>
+          <p:cNvPr id="12" name="Rectangle 11">
+            <a:extLst>
+              <a:ext uri="{FF2B5EF4-FFF2-40B4-BE49-F238E27FC236}">
+                <a16:creationId xmlns:a16="http://schemas.microsoft.com/office/drawing/2014/main" id="{CB44330D-EA18-4254-AA95-EB49948539B8}"/>
+              </a:ext>
+            </a:extLst>
+          </p:cNvPr>
+          <p:cNvSpPr>
+            <a:spLocks noGrp="1" noRot="1" noChangeAspect="1" noMove="1" noResize="1" noEditPoints="1" noAdjustHandles="1" noChangeArrowheads="1" noChangeShapeType="1" noTextEdit="1"/>
+          </p:cNvSpPr>
+          <p:nvPr>
+            <p:extLst>
+              <p:ext uri="{386F3935-93C4-4BCD-93E2-E3B085C9AB24}">
+                <p16:designElem xmlns:p16="http://schemas.microsoft.com/office/powerpoint/2015/main" val="1"/>
+              </p:ext>
+            </p:extLst>
+          </p:nvPr>
+        </p:nvSpPr>
+        <p:spPr>
+          <a:xfrm>
+            <a:off x="477012" y="480060"/>
+            <a:ext cx="11237976" cy="5897880"/>
+          </a:xfrm>
+          <a:prstGeom prst="rect">
+            <a:avLst/>
+          </a:prstGeom>
+          <a:solidFill>
+            <a:srgbClr val="FFFFFF"/>
+          </a:solidFill>
+          <a:ln>
+            <a:noFill/>
+          </a:ln>
+        </p:spPr>
+        <p:style>
+          <a:lnRef idx="2">
+            <a:schemeClr val="accent1">
+              <a:shade val="50000"/>
+            </a:schemeClr>
+          </a:lnRef>
+          <a:fillRef idx="1">
+            <a:schemeClr val="accent1"/>
+          </a:fillRef>
+          <a:effectRef idx="0">
+            <a:schemeClr val="accent1"/>
+          </a:effectRef>
+          <a:fontRef idx="minor">
+            <a:schemeClr val="lt1"/>
+          </a:fontRef>
+        </p:style>
+        <p:txBody>
+          <a:bodyPr rtlCol="0" anchor="ctr"/>
+          <a:lstStyle/>
+          <a:p>
+            <a:pPr algn="ctr"/>
+            <a:endParaRPr lang="en-US"/>
+          </a:p>
+        </p:txBody>
+      </p:sp>
+      <p:pic>
+        <p:nvPicPr>
+          <p:cNvPr id="5" name="Content Placeholder 4" descr="A screenshot of a cell phone&#10;&#10;Description generated with very high confidence">
+            <a:extLst>
+              <a:ext uri="{FF2B5EF4-FFF2-40B4-BE49-F238E27FC236}">
+                <a16:creationId xmlns:a16="http://schemas.microsoft.com/office/drawing/2014/main" id="{1DEEB500-2A49-4195-87D7-EED35794FD6F}"/>
+              </a:ext>
+            </a:extLst>
+          </p:cNvPr>
+          <p:cNvPicPr>
+            <a:picLocks noGrp="1" noChangeAspect="1"/>
+          </p:cNvPicPr>
+          <p:nvPr>
+            <p:ph idx="1"/>
+          </p:nvPr>
+        </p:nvPicPr>
+        <p:blipFill>
+          <a:blip r:embed="rId2">
+            <a:extLst>
+              <a:ext uri="{28A0092B-C50C-407E-A947-70E740481C1C}">
+                <a14:useLocalDpi xmlns:a14="http://schemas.microsoft.com/office/drawing/2010/main" val="0"/>
+              </a:ext>
+            </a:extLst>
+          </a:blip>
+          <a:stretch>
+            <a:fillRect/>
+          </a:stretch>
+        </p:blipFill>
+        <p:spPr>
+          <a:xfrm>
+            <a:off x="1743604" y="643467"/>
+            <a:ext cx="8704792" cy="5571066"/>
+          </a:xfrm>
+          <a:prstGeom prst="rect">
+            <a:avLst/>
+          </a:prstGeom>
+        </p:spPr>
+      </p:pic>
+    </p:spTree>
+    <p:extLst>
+      <p:ext uri="{BB962C8B-B14F-4D97-AF65-F5344CB8AC3E}">
+        <p14:creationId xmlns:p14="http://schemas.microsoft.com/office/powerpoint/2010/main" val="293015067"/>
+      </p:ext>
+    </p:extLst>
+  </p:cSld>
+  <p:clrMapOvr>
+    <a:masterClrMapping/>
+  </p:clrMapOvr>
+</p:sld>
+</file>
+
+<file path=ppt/slides/slide12.xml><?xml version="1.0" encoding="utf-8"?>
+<p:sld xmlns:a="http://schemas.openxmlformats.org/drawingml/2006/main" xmlns:r="http://schemas.openxmlformats.org/officeDocument/2006/relationships" xmlns:p="http://schemas.openxmlformats.org/presentationml/2006/main">
+  <p:cSld>
+    <p:bg>
+      <p:bgPr>
+        <a:solidFill>
+          <a:schemeClr val="bg1"/>
+        </a:solidFill>
+        <a:effectLst/>
+      </p:bgPr>
+    </p:bg>
+    <p:spTree>
+      <p:nvGrpSpPr>
+        <p:cNvPr id="1" name=""/>
+        <p:cNvGrpSpPr/>
+        <p:nvPr/>
+      </p:nvGrpSpPr>
+      <p:grpSpPr>
+        <a:xfrm>
+          <a:off x="0" y="0"/>
+          <a:ext cx="0" cy="0"/>
+          <a:chOff x="0" y="0"/>
+          <a:chExt cx="0" cy="0"/>
+        </a:xfrm>
+      </p:grpSpPr>
+      <p:sp>
+        <p:nvSpPr>
+          <p:cNvPr id="10" name="Rectangle 9">
+            <a:extLst>
+              <a:ext uri="{FF2B5EF4-FFF2-40B4-BE49-F238E27FC236}">
+                <a16:creationId xmlns:a16="http://schemas.microsoft.com/office/drawing/2014/main" id="{32BC26D8-82FB-445E-AA49-62A77D7C1EE0}"/>
+              </a:ext>
+            </a:extLst>
+          </p:cNvPr>
+          <p:cNvSpPr>
+            <a:spLocks noGrp="1" noRot="1" noChangeAspect="1" noMove="1" noResize="1" noEditPoints="1" noAdjustHandles="1" noChangeArrowheads="1" noChangeShapeType="1" noTextEdit="1"/>
+          </p:cNvSpPr>
+          <p:nvPr>
+            <p:extLst>
+              <p:ext uri="{386F3935-93C4-4BCD-93E2-E3B085C9AB24}">
+                <p16:designElem xmlns:p16="http://schemas.microsoft.com/office/powerpoint/2015/main" val="1"/>
+              </p:ext>
+            </p:extLst>
+          </p:nvPr>
+        </p:nvSpPr>
+        <p:spPr>
+          <a:xfrm>
+            <a:off x="0" y="0"/>
+            <a:ext cx="12192000" cy="6858000"/>
+          </a:xfrm>
+          <a:prstGeom prst="rect">
+            <a:avLst/>
+          </a:prstGeom>
+          <a:solidFill>
+            <a:schemeClr val="tx1">
+              <a:lumMod val="65000"/>
+              <a:lumOff val="35000"/>
+            </a:schemeClr>
+          </a:solidFill>
+          <a:ln>
+            <a:noFill/>
+          </a:ln>
+        </p:spPr>
+        <p:style>
+          <a:lnRef idx="2">
+            <a:schemeClr val="accent1">
+              <a:shade val="50000"/>
+            </a:schemeClr>
+          </a:lnRef>
+          <a:fillRef idx="1">
+            <a:schemeClr val="accent1"/>
+          </a:fillRef>
+          <a:effectRef idx="0">
+            <a:schemeClr val="accent1"/>
+          </a:effectRef>
+          <a:fontRef idx="minor">
+            <a:schemeClr val="lt1"/>
+          </a:fontRef>
+        </p:style>
+        <p:txBody>
+          <a:bodyPr rtlCol="0" anchor="ctr"/>
+          <a:lstStyle/>
+          <a:p>
+            <a:pPr algn="ctr"/>
+            <a:endParaRPr lang="en-US"/>
+          </a:p>
+        </p:txBody>
+      </p:sp>
+      <p:sp>
+        <p:nvSpPr>
+          <p:cNvPr id="12" name="Rectangle 11">
+            <a:extLst>
+              <a:ext uri="{FF2B5EF4-FFF2-40B4-BE49-F238E27FC236}">
+                <a16:creationId xmlns:a16="http://schemas.microsoft.com/office/drawing/2014/main" id="{CB44330D-EA18-4254-AA95-EB49948539B8}"/>
+              </a:ext>
+            </a:extLst>
+          </p:cNvPr>
+          <p:cNvSpPr>
+            <a:spLocks noGrp="1" noRot="1" noChangeAspect="1" noMove="1" noResize="1" noEditPoints="1" noAdjustHandles="1" noChangeArrowheads="1" noChangeShapeType="1" noTextEdit="1"/>
+          </p:cNvSpPr>
+          <p:nvPr>
+            <p:extLst>
+              <p:ext uri="{386F3935-93C4-4BCD-93E2-E3B085C9AB24}">
+                <p16:designElem xmlns:p16="http://schemas.microsoft.com/office/powerpoint/2015/main" val="1"/>
+              </p:ext>
+            </p:extLst>
+          </p:nvPr>
+        </p:nvSpPr>
+        <p:spPr>
+          <a:xfrm>
+            <a:off x="477012" y="480060"/>
+            <a:ext cx="11237976" cy="5897880"/>
+          </a:xfrm>
+          <a:prstGeom prst="rect">
+            <a:avLst/>
+          </a:prstGeom>
+          <a:solidFill>
+            <a:srgbClr val="FFFFFF"/>
+          </a:solidFill>
+          <a:ln>
+            <a:noFill/>
+          </a:ln>
+        </p:spPr>
+        <p:style>
+          <a:lnRef idx="2">
+            <a:schemeClr val="accent1">
+              <a:shade val="50000"/>
+            </a:schemeClr>
+          </a:lnRef>
+          <a:fillRef idx="1">
+            <a:schemeClr val="accent1"/>
+          </a:fillRef>
+          <a:effectRef idx="0">
+            <a:schemeClr val="accent1"/>
+          </a:effectRef>
+          <a:fontRef idx="minor">
+            <a:schemeClr val="lt1"/>
+          </a:fontRef>
+        </p:style>
+        <p:txBody>
+          <a:bodyPr rtlCol="0" anchor="ctr"/>
+          <a:lstStyle/>
+          <a:p>
+            <a:pPr algn="ctr"/>
+            <a:endParaRPr lang="en-US"/>
+          </a:p>
+        </p:txBody>
+      </p:sp>
+      <p:pic>
+        <p:nvPicPr>
+          <p:cNvPr id="5" name="Content Placeholder 4" descr="A screenshot of a cell phone&#10;&#10;Description generated with very high confidence">
+            <a:extLst>
+              <a:ext uri="{FF2B5EF4-FFF2-40B4-BE49-F238E27FC236}">
+                <a16:creationId xmlns:a16="http://schemas.microsoft.com/office/drawing/2014/main" id="{E03D7CDE-B0B4-4433-AD35-EB49EB2FD746}"/>
+              </a:ext>
+            </a:extLst>
+          </p:cNvPr>
+          <p:cNvPicPr>
+            <a:picLocks noGrp="1" noChangeAspect="1"/>
+          </p:cNvPicPr>
+          <p:nvPr>
+            <p:ph idx="1"/>
+          </p:nvPr>
+        </p:nvPicPr>
+        <p:blipFill>
+          <a:blip r:embed="rId2">
+            <a:extLst>
+              <a:ext uri="{28A0092B-C50C-407E-A947-70E740481C1C}">
+                <a14:useLocalDpi xmlns:a14="http://schemas.microsoft.com/office/drawing/2010/main" val="0"/>
+              </a:ext>
+            </a:extLst>
+          </a:blip>
+          <a:stretch>
+            <a:fillRect/>
+          </a:stretch>
+        </p:blipFill>
+        <p:spPr>
+          <a:xfrm>
+            <a:off x="1434020" y="643467"/>
+            <a:ext cx="9323959" cy="5571066"/>
+          </a:xfrm>
+          <a:prstGeom prst="rect">
+            <a:avLst/>
+          </a:prstGeom>
+        </p:spPr>
+      </p:pic>
+    </p:spTree>
+    <p:extLst>
+      <p:ext uri="{BB962C8B-B14F-4D97-AF65-F5344CB8AC3E}">
+        <p14:creationId xmlns:p14="http://schemas.microsoft.com/office/powerpoint/2010/main" val="702614363"/>
+      </p:ext>
+    </p:extLst>
+  </p:cSld>
+  <p:clrMapOvr>
+    <a:masterClrMapping/>
+  </p:clrMapOvr>
+</p:sld>
+</file>
+
+<file path=ppt/slides/slide13.xml><?xml version="1.0" encoding="utf-8"?>
+<p:sld xmlns:a="http://schemas.openxmlformats.org/drawingml/2006/main" xmlns:r="http://schemas.openxmlformats.org/officeDocument/2006/relationships" xmlns:p="http://schemas.openxmlformats.org/presentationml/2006/main">
+  <p:cSld>
+    <p:bg>
+      <p:bgPr>
+        <a:solidFill>
+          <a:schemeClr val="bg1"/>
+        </a:solidFill>
+        <a:effectLst/>
+      </p:bgPr>
+    </p:bg>
+    <p:spTree>
+      <p:nvGrpSpPr>
+        <p:cNvPr id="1" name=""/>
+        <p:cNvGrpSpPr/>
+        <p:nvPr/>
+      </p:nvGrpSpPr>
+      <p:grpSpPr>
+        <a:xfrm>
+          <a:off x="0" y="0"/>
+          <a:ext cx="0" cy="0"/>
+          <a:chOff x="0" y="0"/>
+          <a:chExt cx="0" cy="0"/>
+        </a:xfrm>
+      </p:grpSpPr>
+      <p:sp>
+        <p:nvSpPr>
+          <p:cNvPr id="10" name="Rectangle 9">
+            <a:extLst>
+              <a:ext uri="{FF2B5EF4-FFF2-40B4-BE49-F238E27FC236}">
+                <a16:creationId xmlns:a16="http://schemas.microsoft.com/office/drawing/2014/main" id="{32BC26D8-82FB-445E-AA49-62A77D7C1EE0}"/>
+              </a:ext>
+            </a:extLst>
+          </p:cNvPr>
+          <p:cNvSpPr>
+            <a:spLocks noGrp="1" noRot="1" noChangeAspect="1" noMove="1" noResize="1" noEditPoints="1" noAdjustHandles="1" noChangeArrowheads="1" noChangeShapeType="1" noTextEdit="1"/>
+          </p:cNvSpPr>
+          <p:nvPr>
+            <p:extLst>
+              <p:ext uri="{386F3935-93C4-4BCD-93E2-E3B085C9AB24}">
+                <p16:designElem xmlns:p16="http://schemas.microsoft.com/office/powerpoint/2015/main" val="1"/>
+              </p:ext>
+            </p:extLst>
+          </p:nvPr>
+        </p:nvSpPr>
+        <p:spPr>
+          <a:xfrm>
+            <a:off x="0" y="0"/>
+            <a:ext cx="12192000" cy="6858000"/>
+          </a:xfrm>
+          <a:prstGeom prst="rect">
+            <a:avLst/>
+          </a:prstGeom>
+          <a:solidFill>
+            <a:schemeClr val="tx1">
+              <a:lumMod val="65000"/>
+              <a:lumOff val="35000"/>
+            </a:schemeClr>
+          </a:solidFill>
+          <a:ln>
+            <a:noFill/>
+          </a:ln>
+        </p:spPr>
+        <p:style>
+          <a:lnRef idx="2">
+            <a:schemeClr val="accent1">
+              <a:shade val="50000"/>
+            </a:schemeClr>
+          </a:lnRef>
+          <a:fillRef idx="1">
+            <a:schemeClr val="accent1"/>
+          </a:fillRef>
+          <a:effectRef idx="0">
+            <a:schemeClr val="accent1"/>
+          </a:effectRef>
+          <a:fontRef idx="minor">
+            <a:schemeClr val="lt1"/>
+          </a:fontRef>
+        </p:style>
+        <p:txBody>
+          <a:bodyPr rtlCol="0" anchor="ctr"/>
+          <a:lstStyle/>
+          <a:p>
+            <a:pPr algn="ctr"/>
+            <a:endParaRPr lang="en-US"/>
+          </a:p>
+        </p:txBody>
+      </p:sp>
+      <p:sp>
+        <p:nvSpPr>
+          <p:cNvPr id="12" name="Rectangle 11">
+            <a:extLst>
+              <a:ext uri="{FF2B5EF4-FFF2-40B4-BE49-F238E27FC236}">
+                <a16:creationId xmlns:a16="http://schemas.microsoft.com/office/drawing/2014/main" id="{CB44330D-EA18-4254-AA95-EB49948539B8}"/>
+              </a:ext>
+            </a:extLst>
+          </p:cNvPr>
+          <p:cNvSpPr>
+            <a:spLocks noGrp="1" noRot="1" noChangeAspect="1" noMove="1" noResize="1" noEditPoints="1" noAdjustHandles="1" noChangeArrowheads="1" noChangeShapeType="1" noTextEdit="1"/>
+          </p:cNvSpPr>
+          <p:nvPr>
+            <p:extLst>
+              <p:ext uri="{386F3935-93C4-4BCD-93E2-E3B085C9AB24}">
+                <p16:designElem xmlns:p16="http://schemas.microsoft.com/office/powerpoint/2015/main" val="1"/>
+              </p:ext>
+            </p:extLst>
+          </p:nvPr>
+        </p:nvSpPr>
+        <p:spPr>
+          <a:xfrm>
+            <a:off x="477012" y="480060"/>
+            <a:ext cx="11237976" cy="5897880"/>
+          </a:xfrm>
+          <a:prstGeom prst="rect">
+            <a:avLst/>
+          </a:prstGeom>
+          <a:solidFill>
+            <a:srgbClr val="FFFFFF"/>
+          </a:solidFill>
+          <a:ln>
+            <a:noFill/>
+          </a:ln>
+        </p:spPr>
+        <p:style>
+          <a:lnRef idx="2">
+            <a:schemeClr val="accent1">
+              <a:shade val="50000"/>
+            </a:schemeClr>
+          </a:lnRef>
+          <a:fillRef idx="1">
+            <a:schemeClr val="accent1"/>
+          </a:fillRef>
+          <a:effectRef idx="0">
+            <a:schemeClr val="accent1"/>
+          </a:effectRef>
+          <a:fontRef idx="minor">
+            <a:schemeClr val="lt1"/>
+          </a:fontRef>
+        </p:style>
+        <p:txBody>
+          <a:bodyPr rtlCol="0" anchor="ctr"/>
+          <a:lstStyle/>
+          <a:p>
+            <a:pPr algn="ctr"/>
+            <a:endParaRPr lang="en-US"/>
+          </a:p>
+        </p:txBody>
+      </p:sp>
+      <p:pic>
+        <p:nvPicPr>
+          <p:cNvPr id="5" name="Content Placeholder 4">
+            <a:extLst>
+              <a:ext uri="{FF2B5EF4-FFF2-40B4-BE49-F238E27FC236}">
+                <a16:creationId xmlns:a16="http://schemas.microsoft.com/office/drawing/2014/main" id="{3F3F7917-F0FF-48CA-8715-D79F3A539901}"/>
+              </a:ext>
+            </a:extLst>
+          </p:cNvPr>
+          <p:cNvPicPr>
+            <a:picLocks noGrp="1" noChangeAspect="1"/>
+          </p:cNvPicPr>
+          <p:nvPr>
+            <p:ph idx="1"/>
+          </p:nvPr>
+        </p:nvPicPr>
+        <p:blipFill>
+          <a:blip r:embed="rId2">
+            <a:extLst>
+              <a:ext uri="{28A0092B-C50C-407E-A947-70E740481C1C}">
+                <a14:useLocalDpi xmlns:a14="http://schemas.microsoft.com/office/drawing/2010/main" val="0"/>
+              </a:ext>
+            </a:extLst>
+          </a:blip>
+          <a:stretch>
+            <a:fillRect/>
+          </a:stretch>
+        </p:blipFill>
+        <p:spPr>
+          <a:xfrm>
+            <a:off x="1209099" y="643467"/>
+            <a:ext cx="9773801" cy="5571066"/>
+          </a:xfrm>
+          <a:prstGeom prst="rect">
+            <a:avLst/>
+          </a:prstGeom>
+        </p:spPr>
+      </p:pic>
+    </p:spTree>
+    <p:extLst>
+      <p:ext uri="{BB962C8B-B14F-4D97-AF65-F5344CB8AC3E}">
+        <p14:creationId xmlns:p14="http://schemas.microsoft.com/office/powerpoint/2010/main" val="2580099008"/>
+      </p:ext>
+    </p:extLst>
+  </p:cSld>
+  <p:clrMapOvr>
+    <a:masterClrMapping/>
+  </p:clrMapOvr>
+</p:sld>
+</file>
+
+<file path=ppt/slides/slide14.xml><?xml version="1.0" encoding="utf-8"?>
+<p:sld xmlns:a="http://schemas.openxmlformats.org/drawingml/2006/main" xmlns:r="http://schemas.openxmlformats.org/officeDocument/2006/relationships" xmlns:p="http://schemas.openxmlformats.org/presentationml/2006/main">
+  <p:cSld>
+    <p:bg>
+      <p:bgPr>
+        <a:solidFill>
+          <a:schemeClr val="bg1"/>
+        </a:solidFill>
+        <a:effectLst/>
+      </p:bgPr>
+    </p:bg>
+    <p:spTree>
+      <p:nvGrpSpPr>
+        <p:cNvPr id="1" name=""/>
+        <p:cNvGrpSpPr/>
+        <p:nvPr/>
+      </p:nvGrpSpPr>
+      <p:grpSpPr>
+        <a:xfrm>
+          <a:off x="0" y="0"/>
+          <a:ext cx="0" cy="0"/>
+          <a:chOff x="0" y="0"/>
+          <a:chExt cx="0" cy="0"/>
+        </a:xfrm>
+      </p:grpSpPr>
+      <p:sp>
+        <p:nvSpPr>
+          <p:cNvPr id="10" name="Rectangle 9">
+            <a:extLst>
+              <a:ext uri="{FF2B5EF4-FFF2-40B4-BE49-F238E27FC236}">
+                <a16:creationId xmlns:a16="http://schemas.microsoft.com/office/drawing/2014/main" id="{32BC26D8-82FB-445E-AA49-62A77D7C1EE0}"/>
+              </a:ext>
+            </a:extLst>
+          </p:cNvPr>
+          <p:cNvSpPr>
+            <a:spLocks noGrp="1" noRot="1" noChangeAspect="1" noMove="1" noResize="1" noEditPoints="1" noAdjustHandles="1" noChangeArrowheads="1" noChangeShapeType="1" noTextEdit="1"/>
+          </p:cNvSpPr>
+          <p:nvPr>
+            <p:extLst>
+              <p:ext uri="{386F3935-93C4-4BCD-93E2-E3B085C9AB24}">
+                <p16:designElem xmlns:p16="http://schemas.microsoft.com/office/powerpoint/2015/main" val="1"/>
+              </p:ext>
+            </p:extLst>
+          </p:nvPr>
+        </p:nvSpPr>
+        <p:spPr>
+          <a:xfrm>
+            <a:off x="0" y="0"/>
+            <a:ext cx="12192000" cy="6858000"/>
+          </a:xfrm>
+          <a:prstGeom prst="rect">
+            <a:avLst/>
+          </a:prstGeom>
+          <a:solidFill>
+            <a:schemeClr val="tx1">
+              <a:lumMod val="65000"/>
+              <a:lumOff val="35000"/>
+            </a:schemeClr>
+          </a:solidFill>
+          <a:ln>
+            <a:noFill/>
+          </a:ln>
+        </p:spPr>
+        <p:style>
+          <a:lnRef idx="2">
+            <a:schemeClr val="accent1">
+              <a:shade val="50000"/>
+            </a:schemeClr>
+          </a:lnRef>
+          <a:fillRef idx="1">
+            <a:schemeClr val="accent1"/>
+          </a:fillRef>
+          <a:effectRef idx="0">
+            <a:schemeClr val="accent1"/>
+          </a:effectRef>
+          <a:fontRef idx="minor">
+            <a:schemeClr val="lt1"/>
+          </a:fontRef>
+        </p:style>
+        <p:txBody>
+          <a:bodyPr rtlCol="0" anchor="ctr"/>
+          <a:lstStyle/>
+          <a:p>
+            <a:pPr algn="ctr"/>
+            <a:endParaRPr lang="en-US"/>
+          </a:p>
+        </p:txBody>
+      </p:sp>
+      <p:sp>
+        <p:nvSpPr>
+          <p:cNvPr id="12" name="Rectangle 11">
+            <a:extLst>
+              <a:ext uri="{FF2B5EF4-FFF2-40B4-BE49-F238E27FC236}">
+                <a16:creationId xmlns:a16="http://schemas.microsoft.com/office/drawing/2014/main" id="{CB44330D-EA18-4254-AA95-EB49948539B8}"/>
+              </a:ext>
+            </a:extLst>
+          </p:cNvPr>
+          <p:cNvSpPr>
+            <a:spLocks noGrp="1" noRot="1" noChangeAspect="1" noMove="1" noResize="1" noEditPoints="1" noAdjustHandles="1" noChangeArrowheads="1" noChangeShapeType="1" noTextEdit="1"/>
+          </p:cNvSpPr>
+          <p:nvPr>
+            <p:extLst>
+              <p:ext uri="{386F3935-93C4-4BCD-93E2-E3B085C9AB24}">
+                <p16:designElem xmlns:p16="http://schemas.microsoft.com/office/powerpoint/2015/main" val="1"/>
+              </p:ext>
+            </p:extLst>
+          </p:nvPr>
+        </p:nvSpPr>
+        <p:spPr>
+          <a:xfrm>
+            <a:off x="477012" y="480060"/>
+            <a:ext cx="11237976" cy="5897880"/>
+          </a:xfrm>
+          <a:prstGeom prst="rect">
+            <a:avLst/>
+          </a:prstGeom>
+          <a:solidFill>
+            <a:srgbClr val="FFFFFF"/>
+          </a:solidFill>
+          <a:ln>
+            <a:noFill/>
+          </a:ln>
+        </p:spPr>
+        <p:style>
+          <a:lnRef idx="2">
+            <a:schemeClr val="accent1">
+              <a:shade val="50000"/>
+            </a:schemeClr>
+          </a:lnRef>
+          <a:fillRef idx="1">
+            <a:schemeClr val="accent1"/>
+          </a:fillRef>
+          <a:effectRef idx="0">
+            <a:schemeClr val="accent1"/>
+          </a:effectRef>
+          <a:fontRef idx="minor">
+            <a:schemeClr val="lt1"/>
+          </a:fontRef>
+        </p:style>
+        <p:txBody>
+          <a:bodyPr rtlCol="0" anchor="ctr"/>
+          <a:lstStyle/>
+          <a:p>
+            <a:pPr algn="ctr"/>
+            <a:endParaRPr lang="en-US"/>
+          </a:p>
+        </p:txBody>
+      </p:sp>
+      <p:pic>
+        <p:nvPicPr>
+          <p:cNvPr id="5" name="Content Placeholder 4" descr="A screenshot of a cell phone&#10;&#10;Description generated with very high confidence">
+            <a:extLst>
+              <a:ext uri="{FF2B5EF4-FFF2-40B4-BE49-F238E27FC236}">
+                <a16:creationId xmlns:a16="http://schemas.microsoft.com/office/drawing/2014/main" id="{383AAAB8-5B58-45BF-A3FA-57B7444E516A}"/>
+              </a:ext>
+            </a:extLst>
+          </p:cNvPr>
+          <p:cNvPicPr>
+            <a:picLocks noGrp="1" noChangeAspect="1"/>
+          </p:cNvPicPr>
+          <p:nvPr>
+            <p:ph idx="1"/>
+          </p:nvPr>
+        </p:nvPicPr>
+        <p:blipFill>
+          <a:blip r:embed="rId2">
+            <a:extLst>
+              <a:ext uri="{28A0092B-C50C-407E-A947-70E740481C1C}">
+                <a14:useLocalDpi xmlns:a14="http://schemas.microsoft.com/office/drawing/2010/main" val="0"/>
+              </a:ext>
+            </a:extLst>
+          </a:blip>
+          <a:stretch>
+            <a:fillRect/>
+          </a:stretch>
+        </p:blipFill>
+        <p:spPr>
+          <a:xfrm>
+            <a:off x="643467" y="716364"/>
+            <a:ext cx="10905066" cy="5425271"/>
+          </a:xfrm>
+          <a:prstGeom prst="rect">
+            <a:avLst/>
+          </a:prstGeom>
+        </p:spPr>
+      </p:pic>
+    </p:spTree>
+    <p:extLst>
+      <p:ext uri="{BB962C8B-B14F-4D97-AF65-F5344CB8AC3E}">
+        <p14:creationId xmlns:p14="http://schemas.microsoft.com/office/powerpoint/2010/main" val="4031275564"/>
+      </p:ext>
+    </p:extLst>
+  </p:cSld>
+  <p:clrMapOvr>
+    <a:masterClrMapping/>
+  </p:clrMapOvr>
+</p:sld>
+</file>
+
 <file path=ppt/slides/slide2.xml><?xml version="1.0" encoding="utf-8"?>
 <p:sld xmlns:a="http://schemas.openxmlformats.org/drawingml/2006/main" xmlns:r="http://schemas.openxmlformats.org/officeDocument/2006/relationships" xmlns:p="http://schemas.openxmlformats.org/presentationml/2006/main">
   <p:cSld>
@@ -6264,7 +7264,7 @@
         </p:nvSpPr>
         <p:spPr>
           <a:xfrm>
-            <a:off x="5367923" y="3410953"/>
+            <a:off x="5186079" y="2863826"/>
             <a:ext cx="5830785" cy="2092881"/>
           </a:xfrm>
           <a:prstGeom prst="rect">
@@ -6283,10 +7283,9 @@
               <a:buChar char="•"/>
             </a:pPr>
             <a:r>
-              <a:rPr lang="en-US" altLang="zh-CN" sz="2000" dirty="0" err="1"/>
-              <a:t>Mongodb</a:t>
-            </a:r>
-            <a:endParaRPr lang="en-US" altLang="zh-CN" sz="2000" dirty="0"/>
+              <a:rPr lang="en-US" altLang="zh-CN" sz="2000" dirty="0"/>
+              <a:t>Mongoose</a:t>
+            </a:r>
           </a:p>
           <a:p>
             <a:pPr marL="800100" lvl="1" indent="-342900">
@@ -6355,6 +7354,57 @@
           </a:p>
           <a:p>
             <a:endParaRPr lang="en-US" altLang="zh-CN" sz="2000" dirty="0"/>
+          </a:p>
+        </p:txBody>
+      </p:sp>
+      <p:sp>
+        <p:nvSpPr>
+          <p:cNvPr id="4" name="TextBox 3">
+            <a:extLst>
+              <a:ext uri="{FF2B5EF4-FFF2-40B4-BE49-F238E27FC236}">
+                <a16:creationId xmlns:a16="http://schemas.microsoft.com/office/drawing/2014/main" id="{E292EC79-9349-491D-96CA-72239F613733}"/>
+              </a:ext>
+            </a:extLst>
+          </p:cNvPr>
+          <p:cNvSpPr txBox="1"/>
+          <p:nvPr/>
+        </p:nvSpPr>
+        <p:spPr>
+          <a:xfrm>
+            <a:off x="5284520" y="4956707"/>
+            <a:ext cx="5581402" cy="400110"/>
+          </a:xfrm>
+          <a:prstGeom prst="rect">
+            <a:avLst/>
+          </a:prstGeom>
+          <a:noFill/>
+        </p:spPr>
+        <p:txBody>
+          <a:bodyPr wrap="square" rtlCol="0">
+            <a:spAutoFit/>
+          </a:bodyPr>
+          <a:lstStyle/>
+          <a:p>
+            <a:pPr marL="342900" indent="-342900">
+              <a:buFont typeface="Arial" panose="020B0604020202020204" pitchFamily="34" charset="0"/>
+              <a:buChar char="•"/>
+            </a:pPr>
+            <a:r>
+              <a:rPr lang="en-US" altLang="zh-CN" sz="2000" dirty="0"/>
+              <a:t>Mongoose</a:t>
+            </a:r>
+            <a:r>
+              <a:rPr lang="zh-CN" altLang="en-US" sz="2000" dirty="0"/>
+              <a:t>：它能对</a:t>
+            </a:r>
+            <a:r>
+              <a:rPr lang="en-US" altLang="zh-CN" sz="2000" dirty="0" err="1"/>
+              <a:t>Mongodb</a:t>
+            </a:r>
+            <a:r>
+              <a:rPr lang="zh-CN" altLang="en-US" sz="2000" dirty="0"/>
+              <a:t>进行建模操作。</a:t>
+            </a:r>
           </a:p>
         </p:txBody>
       </p:sp>

</xml_diff>